<commit_message>
changed readme.md headings and completed slide deck
</commit_message>
<xml_diff>
--- a/ppt/slide presentation.pptx
+++ b/ppt/slide presentation.pptx
@@ -10,6 +10,11 @@
     <p:sldId id="258" r:id="rId4"/>
     <p:sldId id="259" r:id="rId5"/>
     <p:sldId id="260" r:id="rId6"/>
+    <p:sldId id="261" r:id="rId7"/>
+    <p:sldId id="262" r:id="rId8"/>
+    <p:sldId id="263" r:id="rId9"/>
+    <p:sldId id="264" r:id="rId10"/>
+    <p:sldId id="265" r:id="rId11"/>
   </p:sldIdLst>
   <p:sldSz cx="12192000" cy="6858000"/>
   <p:notesSz cx="6858000" cy="9144000"/>
@@ -3403,20 +3408,22 @@
           </a:xfrm>
         </p:spPr>
         <p:txBody>
-          <a:bodyPr/>
+          <a:bodyPr>
+            <a:normAutofit/>
+          </a:bodyPr>
           <a:lstStyle/>
           <a:p>
             <a:r>
-              <a:rPr lang="en-GB" dirty="0"/>
+              <a:rPr lang="en-GB" sz="3200" dirty="0"/>
               <a:t>By Joshua Phillips</a:t>
             </a:r>
           </a:p>
           <a:p>
             <a:r>
-              <a:rPr lang="en-GB" dirty="0"/>
+              <a:rPr lang="en-GB" sz="3200" dirty="0"/>
               <a:t>For Coder Academy 2023 Term 1 Assignment 3</a:t>
             </a:r>
-            <a:endParaRPr lang="en-AU" dirty="0"/>
+            <a:endParaRPr lang="en-AU" sz="3200" dirty="0"/>
           </a:p>
         </p:txBody>
       </p:sp>
@@ -3424,6 +3431,295 @@
     <p:extLst>
       <p:ext uri="{BB962C8B-B14F-4D97-AF65-F5344CB8AC3E}">
         <p14:creationId xmlns:p14="http://schemas.microsoft.com/office/powerpoint/2010/main" val="678113170"/>
+      </p:ext>
+    </p:extLst>
+  </p:cSld>
+  <p:clrMapOvr>
+    <a:masterClrMapping/>
+  </p:clrMapOvr>
+</p:sld>
+</file>
+
+<file path=ppt/slides/slide10.xml><?xml version="1.0" encoding="utf-8"?>
+<p:sld xmlns:a="http://schemas.openxmlformats.org/drawingml/2006/main" xmlns:r="http://schemas.openxmlformats.org/officeDocument/2006/relationships" xmlns:p="http://schemas.openxmlformats.org/presentationml/2006/main">
+  <p:cSld>
+    <p:spTree>
+      <p:nvGrpSpPr>
+        <p:cNvPr id="1" name=""/>
+        <p:cNvGrpSpPr/>
+        <p:nvPr/>
+      </p:nvGrpSpPr>
+      <p:grpSpPr>
+        <a:xfrm>
+          <a:off x="0" y="0"/>
+          <a:ext cx="0" cy="0"/>
+          <a:chOff x="0" y="0"/>
+          <a:chExt cx="0" cy="0"/>
+        </a:xfrm>
+      </p:grpSpPr>
+      <p:sp>
+        <p:nvSpPr>
+          <p:cNvPr id="2" name="Title 1">
+            <a:extLst>
+              <a:ext uri="{FF2B5EF4-FFF2-40B4-BE49-F238E27FC236}">
+                <a16:creationId xmlns:a16="http://schemas.microsoft.com/office/drawing/2014/main" id="{8868A658-9290-2CF0-C79C-1C3075D648DD}"/>
+              </a:ext>
+            </a:extLst>
+          </p:cNvPr>
+          <p:cNvSpPr>
+            <a:spLocks noGrp="1"/>
+          </p:cNvSpPr>
+          <p:nvPr>
+            <p:ph type="title"/>
+          </p:nvPr>
+        </p:nvSpPr>
+        <p:spPr>
+          <a:xfrm>
+            <a:off x="110613" y="-89156"/>
+            <a:ext cx="10515600" cy="1325563"/>
+          </a:xfrm>
+        </p:spPr>
+        <p:txBody>
+          <a:bodyPr>
+            <a:normAutofit/>
+          </a:bodyPr>
+          <a:lstStyle/>
+          <a:p>
+            <a:r>
+              <a:rPr lang="en-GB" dirty="0"/>
+              <a:t>Review of application project</a:t>
+            </a:r>
+            <a:endParaRPr lang="en-AU" dirty="0"/>
+          </a:p>
+        </p:txBody>
+      </p:sp>
+      <p:sp>
+        <p:nvSpPr>
+          <p:cNvPr id="3" name="Content Placeholder 2">
+            <a:extLst>
+              <a:ext uri="{FF2B5EF4-FFF2-40B4-BE49-F238E27FC236}">
+                <a16:creationId xmlns:a16="http://schemas.microsoft.com/office/drawing/2014/main" id="{D316F8CB-0AC9-2311-9F2C-4FC55698D109}"/>
+              </a:ext>
+            </a:extLst>
+          </p:cNvPr>
+          <p:cNvSpPr txBox="1">
+            <a:spLocks/>
+          </p:cNvSpPr>
+          <p:nvPr/>
+        </p:nvSpPr>
+        <p:spPr>
+          <a:xfrm>
+            <a:off x="305704" y="1363579"/>
+            <a:ext cx="9784779" cy="5181600"/>
+          </a:xfrm>
+          <a:prstGeom prst="rect">
+            <a:avLst/>
+          </a:prstGeom>
+        </p:spPr>
+        <p:txBody>
+          <a:bodyPr vert="horz" lIns="91440" tIns="45720" rIns="91440" bIns="45720" rtlCol="0">
+            <a:normAutofit/>
+          </a:bodyPr>
+          <a:lstStyle>
+            <a:lvl1pPr marL="228600" indent="-228600" algn="l" defTabSz="914400" rtl="0" eaLnBrk="1" latinLnBrk="0" hangingPunct="1">
+              <a:lnSpc>
+                <a:spcPct val="90000"/>
+              </a:lnSpc>
+              <a:spcBef>
+                <a:spcPts val="1000"/>
+              </a:spcBef>
+              <a:buFont typeface="Arial" panose="020B0604020202020204" pitchFamily="34" charset="0"/>
+              <a:buChar char="•"/>
+              <a:defRPr sz="2800" kern="1200">
+                <a:solidFill>
+                  <a:schemeClr val="tx1"/>
+                </a:solidFill>
+                <a:latin typeface="+mn-lt"/>
+                <a:ea typeface="+mn-ea"/>
+                <a:cs typeface="+mn-cs"/>
+              </a:defRPr>
+            </a:lvl1pPr>
+            <a:lvl2pPr marL="685800" indent="-228600" algn="l" defTabSz="914400" rtl="0" eaLnBrk="1" latinLnBrk="0" hangingPunct="1">
+              <a:lnSpc>
+                <a:spcPct val="90000"/>
+              </a:lnSpc>
+              <a:spcBef>
+                <a:spcPts val="500"/>
+              </a:spcBef>
+              <a:buFont typeface="Arial" panose="020B0604020202020204" pitchFamily="34" charset="0"/>
+              <a:buChar char="•"/>
+              <a:defRPr sz="2400" kern="1200">
+                <a:solidFill>
+                  <a:schemeClr val="tx1"/>
+                </a:solidFill>
+                <a:latin typeface="+mn-lt"/>
+                <a:ea typeface="+mn-ea"/>
+                <a:cs typeface="+mn-cs"/>
+              </a:defRPr>
+            </a:lvl2pPr>
+            <a:lvl3pPr marL="1143000" indent="-228600" algn="l" defTabSz="914400" rtl="0" eaLnBrk="1" latinLnBrk="0" hangingPunct="1">
+              <a:lnSpc>
+                <a:spcPct val="90000"/>
+              </a:lnSpc>
+              <a:spcBef>
+                <a:spcPts val="500"/>
+              </a:spcBef>
+              <a:buFont typeface="Arial" panose="020B0604020202020204" pitchFamily="34" charset="0"/>
+              <a:buChar char="•"/>
+              <a:defRPr sz="2000" kern="1200">
+                <a:solidFill>
+                  <a:schemeClr val="tx1"/>
+                </a:solidFill>
+                <a:latin typeface="+mn-lt"/>
+                <a:ea typeface="+mn-ea"/>
+                <a:cs typeface="+mn-cs"/>
+              </a:defRPr>
+            </a:lvl3pPr>
+            <a:lvl4pPr marL="1600200" indent="-228600" algn="l" defTabSz="914400" rtl="0" eaLnBrk="1" latinLnBrk="0" hangingPunct="1">
+              <a:lnSpc>
+                <a:spcPct val="90000"/>
+              </a:lnSpc>
+              <a:spcBef>
+                <a:spcPts val="500"/>
+              </a:spcBef>
+              <a:buFont typeface="Arial" panose="020B0604020202020204" pitchFamily="34" charset="0"/>
+              <a:buChar char="•"/>
+              <a:defRPr sz="1800" kern="1200">
+                <a:solidFill>
+                  <a:schemeClr val="tx1"/>
+                </a:solidFill>
+                <a:latin typeface="+mn-lt"/>
+                <a:ea typeface="+mn-ea"/>
+                <a:cs typeface="+mn-cs"/>
+              </a:defRPr>
+            </a:lvl4pPr>
+            <a:lvl5pPr marL="2057400" indent="-228600" algn="l" defTabSz="914400" rtl="0" eaLnBrk="1" latinLnBrk="0" hangingPunct="1">
+              <a:lnSpc>
+                <a:spcPct val="90000"/>
+              </a:lnSpc>
+              <a:spcBef>
+                <a:spcPts val="500"/>
+              </a:spcBef>
+              <a:buFont typeface="Arial" panose="020B0604020202020204" pitchFamily="34" charset="0"/>
+              <a:buChar char="•"/>
+              <a:defRPr sz="1800" kern="1200">
+                <a:solidFill>
+                  <a:schemeClr val="tx1"/>
+                </a:solidFill>
+                <a:latin typeface="+mn-lt"/>
+                <a:ea typeface="+mn-ea"/>
+                <a:cs typeface="+mn-cs"/>
+              </a:defRPr>
+            </a:lvl5pPr>
+            <a:lvl6pPr marL="2514600" indent="-228600" algn="l" defTabSz="914400" rtl="0" eaLnBrk="1" latinLnBrk="0" hangingPunct="1">
+              <a:lnSpc>
+                <a:spcPct val="90000"/>
+              </a:lnSpc>
+              <a:spcBef>
+                <a:spcPts val="500"/>
+              </a:spcBef>
+              <a:buFont typeface="Arial" panose="020B0604020202020204" pitchFamily="34" charset="0"/>
+              <a:buChar char="•"/>
+              <a:defRPr sz="1800" kern="1200">
+                <a:solidFill>
+                  <a:schemeClr val="tx1"/>
+                </a:solidFill>
+                <a:latin typeface="+mn-lt"/>
+                <a:ea typeface="+mn-ea"/>
+                <a:cs typeface="+mn-cs"/>
+              </a:defRPr>
+            </a:lvl6pPr>
+            <a:lvl7pPr marL="2971800" indent="-228600" algn="l" defTabSz="914400" rtl="0" eaLnBrk="1" latinLnBrk="0" hangingPunct="1">
+              <a:lnSpc>
+                <a:spcPct val="90000"/>
+              </a:lnSpc>
+              <a:spcBef>
+                <a:spcPts val="500"/>
+              </a:spcBef>
+              <a:buFont typeface="Arial" panose="020B0604020202020204" pitchFamily="34" charset="0"/>
+              <a:buChar char="•"/>
+              <a:defRPr sz="1800" kern="1200">
+                <a:solidFill>
+                  <a:schemeClr val="tx1"/>
+                </a:solidFill>
+                <a:latin typeface="+mn-lt"/>
+                <a:ea typeface="+mn-ea"/>
+                <a:cs typeface="+mn-cs"/>
+              </a:defRPr>
+            </a:lvl7pPr>
+            <a:lvl8pPr marL="3429000" indent="-228600" algn="l" defTabSz="914400" rtl="0" eaLnBrk="1" latinLnBrk="0" hangingPunct="1">
+              <a:lnSpc>
+                <a:spcPct val="90000"/>
+              </a:lnSpc>
+              <a:spcBef>
+                <a:spcPts val="500"/>
+              </a:spcBef>
+              <a:buFont typeface="Arial" panose="020B0604020202020204" pitchFamily="34" charset="0"/>
+              <a:buChar char="•"/>
+              <a:defRPr sz="1800" kern="1200">
+                <a:solidFill>
+                  <a:schemeClr val="tx1"/>
+                </a:solidFill>
+                <a:latin typeface="+mn-lt"/>
+                <a:ea typeface="+mn-ea"/>
+                <a:cs typeface="+mn-cs"/>
+              </a:defRPr>
+            </a:lvl8pPr>
+            <a:lvl9pPr marL="3886200" indent="-228600" algn="l" defTabSz="914400" rtl="0" eaLnBrk="1" latinLnBrk="0" hangingPunct="1">
+              <a:lnSpc>
+                <a:spcPct val="90000"/>
+              </a:lnSpc>
+              <a:spcBef>
+                <a:spcPts val="500"/>
+              </a:spcBef>
+              <a:buFont typeface="Arial" panose="020B0604020202020204" pitchFamily="34" charset="0"/>
+              <a:buChar char="•"/>
+              <a:defRPr sz="1800" kern="1200">
+                <a:solidFill>
+                  <a:schemeClr val="tx1"/>
+                </a:solidFill>
+                <a:latin typeface="+mn-lt"/>
+                <a:ea typeface="+mn-ea"/>
+                <a:cs typeface="+mn-cs"/>
+              </a:defRPr>
+            </a:lvl9pPr>
+          </a:lstStyle>
+          <a:p>
+            <a:r>
+              <a:rPr lang="en-GB" dirty="0"/>
+              <a:t>Good learning experience. Got better at problem solving and python coding, especially error handling. </a:t>
+            </a:r>
+          </a:p>
+          <a:p>
+            <a:r>
+              <a:rPr lang="en-GB" dirty="0"/>
+              <a:t>Challenged initially on how to create a maze.</a:t>
+            </a:r>
+          </a:p>
+          <a:p>
+            <a:r>
+              <a:rPr lang="en-GB" dirty="0"/>
+              <a:t>Would of liked to do more test driven development.</a:t>
+            </a:r>
+          </a:p>
+          <a:p>
+            <a:r>
+              <a:rPr lang="en-GB" dirty="0"/>
+              <a:t>My Bash script is a bit too simple. Would like to learn more about it.</a:t>
+            </a:r>
+          </a:p>
+          <a:p>
+            <a:r>
+              <a:rPr lang="en-AU" dirty="0"/>
+              <a:t>Trello board was a big help.</a:t>
+            </a:r>
+          </a:p>
+        </p:txBody>
+      </p:sp>
+    </p:spTree>
+    <p:extLst>
+      <p:ext uri="{BB962C8B-B14F-4D97-AF65-F5344CB8AC3E}">
+        <p14:creationId xmlns:p14="http://schemas.microsoft.com/office/powerpoint/2010/main" val="3543841943"/>
       </p:ext>
     </p:extLst>
   </p:cSld>
@@ -5357,6 +5653,1092 @@
     <p:extLst>
       <p:ext uri="{BB962C8B-B14F-4D97-AF65-F5344CB8AC3E}">
         <p14:creationId xmlns:p14="http://schemas.microsoft.com/office/powerpoint/2010/main" val="302398415"/>
+      </p:ext>
+    </p:extLst>
+  </p:cSld>
+  <p:clrMapOvr>
+    <a:masterClrMapping/>
+  </p:clrMapOvr>
+</p:sld>
+</file>
+
+<file path=ppt/slides/slide6.xml><?xml version="1.0" encoding="utf-8"?>
+<p:sld xmlns:a="http://schemas.openxmlformats.org/drawingml/2006/main" xmlns:r="http://schemas.openxmlformats.org/officeDocument/2006/relationships" xmlns:p="http://schemas.openxmlformats.org/presentationml/2006/main">
+  <p:cSld>
+    <p:spTree>
+      <p:nvGrpSpPr>
+        <p:cNvPr id="1" name=""/>
+        <p:cNvGrpSpPr/>
+        <p:nvPr/>
+      </p:nvGrpSpPr>
+      <p:grpSpPr>
+        <a:xfrm>
+          <a:off x="0" y="0"/>
+          <a:ext cx="0" cy="0"/>
+          <a:chOff x="0" y="0"/>
+          <a:chExt cx="0" cy="0"/>
+        </a:xfrm>
+      </p:grpSpPr>
+      <p:sp>
+        <p:nvSpPr>
+          <p:cNvPr id="2" name="Title 1">
+            <a:extLst>
+              <a:ext uri="{FF2B5EF4-FFF2-40B4-BE49-F238E27FC236}">
+                <a16:creationId xmlns:a16="http://schemas.microsoft.com/office/drawing/2014/main" id="{8868A658-9290-2CF0-C79C-1C3075D648DD}"/>
+              </a:ext>
+            </a:extLst>
+          </p:cNvPr>
+          <p:cNvSpPr>
+            <a:spLocks noGrp="1"/>
+          </p:cNvSpPr>
+          <p:nvPr>
+            <p:ph type="title"/>
+          </p:nvPr>
+        </p:nvSpPr>
+        <p:spPr>
+          <a:xfrm>
+            <a:off x="81116" y="-244475"/>
+            <a:ext cx="10515600" cy="1325563"/>
+          </a:xfrm>
+        </p:spPr>
+        <p:txBody>
+          <a:bodyPr>
+            <a:normAutofit/>
+          </a:bodyPr>
+          <a:lstStyle/>
+          <a:p>
+            <a:r>
+              <a:rPr lang="en-GB" sz="3600" dirty="0"/>
+              <a:t>Features: Single Maze gaming mode</a:t>
+            </a:r>
+            <a:endParaRPr lang="en-AU" sz="3600" dirty="0"/>
+          </a:p>
+        </p:txBody>
+      </p:sp>
+      <p:sp>
+        <p:nvSpPr>
+          <p:cNvPr id="4" name="Content Placeholder 2">
+            <a:extLst>
+              <a:ext uri="{FF2B5EF4-FFF2-40B4-BE49-F238E27FC236}">
+                <a16:creationId xmlns:a16="http://schemas.microsoft.com/office/drawing/2014/main" id="{54DC3A41-1129-99F1-AF44-7A10F0118AB7}"/>
+              </a:ext>
+            </a:extLst>
+          </p:cNvPr>
+          <p:cNvSpPr txBox="1">
+            <a:spLocks/>
+          </p:cNvSpPr>
+          <p:nvPr/>
+        </p:nvSpPr>
+        <p:spPr>
+          <a:xfrm>
+            <a:off x="81116" y="532122"/>
+            <a:ext cx="3950110" cy="583279"/>
+          </a:xfrm>
+          <a:prstGeom prst="rect">
+            <a:avLst/>
+          </a:prstGeom>
+        </p:spPr>
+        <p:txBody>
+          <a:bodyPr vert="horz" lIns="91440" tIns="45720" rIns="91440" bIns="45720" rtlCol="0">
+            <a:normAutofit/>
+          </a:bodyPr>
+          <a:lstStyle>
+            <a:lvl1pPr marL="228600" indent="-228600" algn="l" defTabSz="914400" rtl="0" eaLnBrk="1" latinLnBrk="0" hangingPunct="1">
+              <a:lnSpc>
+                <a:spcPct val="90000"/>
+              </a:lnSpc>
+              <a:spcBef>
+                <a:spcPts val="1000"/>
+              </a:spcBef>
+              <a:buFont typeface="Arial" panose="020B0604020202020204" pitchFamily="34" charset="0"/>
+              <a:buChar char="•"/>
+              <a:defRPr sz="2800" kern="1200">
+                <a:solidFill>
+                  <a:schemeClr val="tx1"/>
+                </a:solidFill>
+                <a:latin typeface="+mn-lt"/>
+                <a:ea typeface="+mn-ea"/>
+                <a:cs typeface="+mn-cs"/>
+              </a:defRPr>
+            </a:lvl1pPr>
+            <a:lvl2pPr marL="685800" indent="-228600" algn="l" defTabSz="914400" rtl="0" eaLnBrk="1" latinLnBrk="0" hangingPunct="1">
+              <a:lnSpc>
+                <a:spcPct val="90000"/>
+              </a:lnSpc>
+              <a:spcBef>
+                <a:spcPts val="500"/>
+              </a:spcBef>
+              <a:buFont typeface="Arial" panose="020B0604020202020204" pitchFamily="34" charset="0"/>
+              <a:buChar char="•"/>
+              <a:defRPr sz="2400" kern="1200">
+                <a:solidFill>
+                  <a:schemeClr val="tx1"/>
+                </a:solidFill>
+                <a:latin typeface="+mn-lt"/>
+                <a:ea typeface="+mn-ea"/>
+                <a:cs typeface="+mn-cs"/>
+              </a:defRPr>
+            </a:lvl2pPr>
+            <a:lvl3pPr marL="1143000" indent="-228600" algn="l" defTabSz="914400" rtl="0" eaLnBrk="1" latinLnBrk="0" hangingPunct="1">
+              <a:lnSpc>
+                <a:spcPct val="90000"/>
+              </a:lnSpc>
+              <a:spcBef>
+                <a:spcPts val="500"/>
+              </a:spcBef>
+              <a:buFont typeface="Arial" panose="020B0604020202020204" pitchFamily="34" charset="0"/>
+              <a:buChar char="•"/>
+              <a:defRPr sz="2000" kern="1200">
+                <a:solidFill>
+                  <a:schemeClr val="tx1"/>
+                </a:solidFill>
+                <a:latin typeface="+mn-lt"/>
+                <a:ea typeface="+mn-ea"/>
+                <a:cs typeface="+mn-cs"/>
+              </a:defRPr>
+            </a:lvl3pPr>
+            <a:lvl4pPr marL="1600200" indent="-228600" algn="l" defTabSz="914400" rtl="0" eaLnBrk="1" latinLnBrk="0" hangingPunct="1">
+              <a:lnSpc>
+                <a:spcPct val="90000"/>
+              </a:lnSpc>
+              <a:spcBef>
+                <a:spcPts val="500"/>
+              </a:spcBef>
+              <a:buFont typeface="Arial" panose="020B0604020202020204" pitchFamily="34" charset="0"/>
+              <a:buChar char="•"/>
+              <a:defRPr sz="1800" kern="1200">
+                <a:solidFill>
+                  <a:schemeClr val="tx1"/>
+                </a:solidFill>
+                <a:latin typeface="+mn-lt"/>
+                <a:ea typeface="+mn-ea"/>
+                <a:cs typeface="+mn-cs"/>
+              </a:defRPr>
+            </a:lvl4pPr>
+            <a:lvl5pPr marL="2057400" indent="-228600" algn="l" defTabSz="914400" rtl="0" eaLnBrk="1" latinLnBrk="0" hangingPunct="1">
+              <a:lnSpc>
+                <a:spcPct val="90000"/>
+              </a:lnSpc>
+              <a:spcBef>
+                <a:spcPts val="500"/>
+              </a:spcBef>
+              <a:buFont typeface="Arial" panose="020B0604020202020204" pitchFamily="34" charset="0"/>
+              <a:buChar char="•"/>
+              <a:defRPr sz="1800" kern="1200">
+                <a:solidFill>
+                  <a:schemeClr val="tx1"/>
+                </a:solidFill>
+                <a:latin typeface="+mn-lt"/>
+                <a:ea typeface="+mn-ea"/>
+                <a:cs typeface="+mn-cs"/>
+              </a:defRPr>
+            </a:lvl5pPr>
+            <a:lvl6pPr marL="2514600" indent="-228600" algn="l" defTabSz="914400" rtl="0" eaLnBrk="1" latinLnBrk="0" hangingPunct="1">
+              <a:lnSpc>
+                <a:spcPct val="90000"/>
+              </a:lnSpc>
+              <a:spcBef>
+                <a:spcPts val="500"/>
+              </a:spcBef>
+              <a:buFont typeface="Arial" panose="020B0604020202020204" pitchFamily="34" charset="0"/>
+              <a:buChar char="•"/>
+              <a:defRPr sz="1800" kern="1200">
+                <a:solidFill>
+                  <a:schemeClr val="tx1"/>
+                </a:solidFill>
+                <a:latin typeface="+mn-lt"/>
+                <a:ea typeface="+mn-ea"/>
+                <a:cs typeface="+mn-cs"/>
+              </a:defRPr>
+            </a:lvl6pPr>
+            <a:lvl7pPr marL="2971800" indent="-228600" algn="l" defTabSz="914400" rtl="0" eaLnBrk="1" latinLnBrk="0" hangingPunct="1">
+              <a:lnSpc>
+                <a:spcPct val="90000"/>
+              </a:lnSpc>
+              <a:spcBef>
+                <a:spcPts val="500"/>
+              </a:spcBef>
+              <a:buFont typeface="Arial" panose="020B0604020202020204" pitchFamily="34" charset="0"/>
+              <a:buChar char="•"/>
+              <a:defRPr sz="1800" kern="1200">
+                <a:solidFill>
+                  <a:schemeClr val="tx1"/>
+                </a:solidFill>
+                <a:latin typeface="+mn-lt"/>
+                <a:ea typeface="+mn-ea"/>
+                <a:cs typeface="+mn-cs"/>
+              </a:defRPr>
+            </a:lvl7pPr>
+            <a:lvl8pPr marL="3429000" indent="-228600" algn="l" defTabSz="914400" rtl="0" eaLnBrk="1" latinLnBrk="0" hangingPunct="1">
+              <a:lnSpc>
+                <a:spcPct val="90000"/>
+              </a:lnSpc>
+              <a:spcBef>
+                <a:spcPts val="500"/>
+              </a:spcBef>
+              <a:buFont typeface="Arial" panose="020B0604020202020204" pitchFamily="34" charset="0"/>
+              <a:buChar char="•"/>
+              <a:defRPr sz="1800" kern="1200">
+                <a:solidFill>
+                  <a:schemeClr val="tx1"/>
+                </a:solidFill>
+                <a:latin typeface="+mn-lt"/>
+                <a:ea typeface="+mn-ea"/>
+                <a:cs typeface="+mn-cs"/>
+              </a:defRPr>
+            </a:lvl8pPr>
+            <a:lvl9pPr marL="3886200" indent="-228600" algn="l" defTabSz="914400" rtl="0" eaLnBrk="1" latinLnBrk="0" hangingPunct="1">
+              <a:lnSpc>
+                <a:spcPct val="90000"/>
+              </a:lnSpc>
+              <a:spcBef>
+                <a:spcPts val="500"/>
+              </a:spcBef>
+              <a:buFont typeface="Arial" panose="020B0604020202020204" pitchFamily="34" charset="0"/>
+              <a:buChar char="•"/>
+              <a:defRPr sz="1800" kern="1200">
+                <a:solidFill>
+                  <a:schemeClr val="tx1"/>
+                </a:solidFill>
+                <a:latin typeface="+mn-lt"/>
+                <a:ea typeface="+mn-ea"/>
+                <a:cs typeface="+mn-cs"/>
+              </a:defRPr>
+            </a:lvl9pPr>
+          </a:lstStyle>
+          <a:p>
+            <a:pPr marL="0" indent="0">
+              <a:buFont typeface="Arial" panose="020B0604020202020204" pitchFamily="34" charset="0"/>
+              <a:buNone/>
+            </a:pPr>
+            <a:r>
+              <a:rPr lang="en-GB" sz="2000" dirty="0"/>
+              <a:t>maze_modes.py</a:t>
+            </a:r>
+            <a:endParaRPr lang="en-AU" sz="2000" dirty="0"/>
+          </a:p>
+        </p:txBody>
+      </p:sp>
+      <p:pic>
+        <p:nvPicPr>
+          <p:cNvPr id="6" name="Picture 5">
+            <a:extLst>
+              <a:ext uri="{FF2B5EF4-FFF2-40B4-BE49-F238E27FC236}">
+                <a16:creationId xmlns:a16="http://schemas.microsoft.com/office/drawing/2014/main" id="{26520A1A-8A30-E5E9-2B2C-B545DD56C3D8}"/>
+              </a:ext>
+            </a:extLst>
+          </p:cNvPr>
+          <p:cNvPicPr>
+            <a:picLocks noChangeAspect="1"/>
+          </p:cNvPicPr>
+          <p:nvPr/>
+        </p:nvPicPr>
+        <p:blipFill>
+          <a:blip r:embed="rId2"/>
+          <a:stretch>
+            <a:fillRect/>
+          </a:stretch>
+        </p:blipFill>
+        <p:spPr>
+          <a:xfrm>
+            <a:off x="169202" y="1164560"/>
+            <a:ext cx="6485182" cy="3481080"/>
+          </a:xfrm>
+          <a:prstGeom prst="rect">
+            <a:avLst/>
+          </a:prstGeom>
+        </p:spPr>
+      </p:pic>
+      <p:pic>
+        <p:nvPicPr>
+          <p:cNvPr id="8" name="Picture 7">
+            <a:extLst>
+              <a:ext uri="{FF2B5EF4-FFF2-40B4-BE49-F238E27FC236}">
+                <a16:creationId xmlns:a16="http://schemas.microsoft.com/office/drawing/2014/main" id="{6D609BEF-637E-A21B-A5D3-6AED4F563DE6}"/>
+              </a:ext>
+            </a:extLst>
+          </p:cNvPr>
+          <p:cNvPicPr>
+            <a:picLocks noChangeAspect="1"/>
+          </p:cNvPicPr>
+          <p:nvPr/>
+        </p:nvPicPr>
+        <p:blipFill>
+          <a:blip r:embed="rId3"/>
+          <a:stretch>
+            <a:fillRect/>
+          </a:stretch>
+        </p:blipFill>
+        <p:spPr>
+          <a:xfrm>
+            <a:off x="1092699" y="4950979"/>
+            <a:ext cx="4638187" cy="1306815"/>
+          </a:xfrm>
+          <a:prstGeom prst="rect">
+            <a:avLst/>
+          </a:prstGeom>
+        </p:spPr>
+      </p:pic>
+      <p:pic>
+        <p:nvPicPr>
+          <p:cNvPr id="12" name="Picture 11">
+            <a:extLst>
+              <a:ext uri="{FF2B5EF4-FFF2-40B4-BE49-F238E27FC236}">
+                <a16:creationId xmlns:a16="http://schemas.microsoft.com/office/drawing/2014/main" id="{2D3C11D2-6EFE-CD9D-150E-26330C0BA3B5}"/>
+              </a:ext>
+            </a:extLst>
+          </p:cNvPr>
+          <p:cNvPicPr>
+            <a:picLocks noChangeAspect="1"/>
+          </p:cNvPicPr>
+          <p:nvPr/>
+        </p:nvPicPr>
+        <p:blipFill>
+          <a:blip r:embed="rId4"/>
+          <a:stretch>
+            <a:fillRect/>
+          </a:stretch>
+        </p:blipFill>
+        <p:spPr>
+          <a:xfrm>
+            <a:off x="6862916" y="1499880"/>
+            <a:ext cx="5159882" cy="4104507"/>
+          </a:xfrm>
+          <a:prstGeom prst="rect">
+            <a:avLst/>
+          </a:prstGeom>
+        </p:spPr>
+      </p:pic>
+    </p:spTree>
+    <p:extLst>
+      <p:ext uri="{BB962C8B-B14F-4D97-AF65-F5344CB8AC3E}">
+        <p14:creationId xmlns:p14="http://schemas.microsoft.com/office/powerpoint/2010/main" val="2700750906"/>
+      </p:ext>
+    </p:extLst>
+  </p:cSld>
+  <p:clrMapOvr>
+    <a:masterClrMapping/>
+  </p:clrMapOvr>
+</p:sld>
+</file>
+
+<file path=ppt/slides/slide7.xml><?xml version="1.0" encoding="utf-8"?>
+<p:sld xmlns:a="http://schemas.openxmlformats.org/drawingml/2006/main" xmlns:r="http://schemas.openxmlformats.org/officeDocument/2006/relationships" xmlns:p="http://schemas.openxmlformats.org/presentationml/2006/main">
+  <p:cSld>
+    <p:spTree>
+      <p:nvGrpSpPr>
+        <p:cNvPr id="1" name=""/>
+        <p:cNvGrpSpPr/>
+        <p:nvPr/>
+      </p:nvGrpSpPr>
+      <p:grpSpPr>
+        <a:xfrm>
+          <a:off x="0" y="0"/>
+          <a:ext cx="0" cy="0"/>
+          <a:chOff x="0" y="0"/>
+          <a:chExt cx="0" cy="0"/>
+        </a:xfrm>
+      </p:grpSpPr>
+      <p:sp>
+        <p:nvSpPr>
+          <p:cNvPr id="2" name="Title 1">
+            <a:extLst>
+              <a:ext uri="{FF2B5EF4-FFF2-40B4-BE49-F238E27FC236}">
+                <a16:creationId xmlns:a16="http://schemas.microsoft.com/office/drawing/2014/main" id="{8868A658-9290-2CF0-C79C-1C3075D648DD}"/>
+              </a:ext>
+            </a:extLst>
+          </p:cNvPr>
+          <p:cNvSpPr>
+            <a:spLocks noGrp="1"/>
+          </p:cNvSpPr>
+          <p:nvPr>
+            <p:ph type="title"/>
+          </p:nvPr>
+        </p:nvSpPr>
+        <p:spPr>
+          <a:xfrm>
+            <a:off x="81116" y="-244475"/>
+            <a:ext cx="10515600" cy="1325563"/>
+          </a:xfrm>
+        </p:spPr>
+        <p:txBody>
+          <a:bodyPr>
+            <a:normAutofit/>
+          </a:bodyPr>
+          <a:lstStyle/>
+          <a:p>
+            <a:r>
+              <a:rPr lang="en-GB" sz="3600" dirty="0"/>
+              <a:t>Features: Setting Maze wall colour </a:t>
+            </a:r>
+            <a:endParaRPr lang="en-AU" sz="3600" dirty="0"/>
+          </a:p>
+        </p:txBody>
+      </p:sp>
+      <p:sp>
+        <p:nvSpPr>
+          <p:cNvPr id="4" name="Content Placeholder 2">
+            <a:extLst>
+              <a:ext uri="{FF2B5EF4-FFF2-40B4-BE49-F238E27FC236}">
+                <a16:creationId xmlns:a16="http://schemas.microsoft.com/office/drawing/2014/main" id="{54DC3A41-1129-99F1-AF44-7A10F0118AB7}"/>
+              </a:ext>
+            </a:extLst>
+          </p:cNvPr>
+          <p:cNvSpPr txBox="1">
+            <a:spLocks/>
+          </p:cNvSpPr>
+          <p:nvPr/>
+        </p:nvSpPr>
+        <p:spPr>
+          <a:xfrm>
+            <a:off x="81116" y="532122"/>
+            <a:ext cx="3950110" cy="583279"/>
+          </a:xfrm>
+          <a:prstGeom prst="rect">
+            <a:avLst/>
+          </a:prstGeom>
+        </p:spPr>
+        <p:txBody>
+          <a:bodyPr vert="horz" lIns="91440" tIns="45720" rIns="91440" bIns="45720" rtlCol="0">
+            <a:normAutofit/>
+          </a:bodyPr>
+          <a:lstStyle>
+            <a:lvl1pPr marL="228600" indent="-228600" algn="l" defTabSz="914400" rtl="0" eaLnBrk="1" latinLnBrk="0" hangingPunct="1">
+              <a:lnSpc>
+                <a:spcPct val="90000"/>
+              </a:lnSpc>
+              <a:spcBef>
+                <a:spcPts val="1000"/>
+              </a:spcBef>
+              <a:buFont typeface="Arial" panose="020B0604020202020204" pitchFamily="34" charset="0"/>
+              <a:buChar char="•"/>
+              <a:defRPr sz="2800" kern="1200">
+                <a:solidFill>
+                  <a:schemeClr val="tx1"/>
+                </a:solidFill>
+                <a:latin typeface="+mn-lt"/>
+                <a:ea typeface="+mn-ea"/>
+                <a:cs typeface="+mn-cs"/>
+              </a:defRPr>
+            </a:lvl1pPr>
+            <a:lvl2pPr marL="685800" indent="-228600" algn="l" defTabSz="914400" rtl="0" eaLnBrk="1" latinLnBrk="0" hangingPunct="1">
+              <a:lnSpc>
+                <a:spcPct val="90000"/>
+              </a:lnSpc>
+              <a:spcBef>
+                <a:spcPts val="500"/>
+              </a:spcBef>
+              <a:buFont typeface="Arial" panose="020B0604020202020204" pitchFamily="34" charset="0"/>
+              <a:buChar char="•"/>
+              <a:defRPr sz="2400" kern="1200">
+                <a:solidFill>
+                  <a:schemeClr val="tx1"/>
+                </a:solidFill>
+                <a:latin typeface="+mn-lt"/>
+                <a:ea typeface="+mn-ea"/>
+                <a:cs typeface="+mn-cs"/>
+              </a:defRPr>
+            </a:lvl2pPr>
+            <a:lvl3pPr marL="1143000" indent="-228600" algn="l" defTabSz="914400" rtl="0" eaLnBrk="1" latinLnBrk="0" hangingPunct="1">
+              <a:lnSpc>
+                <a:spcPct val="90000"/>
+              </a:lnSpc>
+              <a:spcBef>
+                <a:spcPts val="500"/>
+              </a:spcBef>
+              <a:buFont typeface="Arial" panose="020B0604020202020204" pitchFamily="34" charset="0"/>
+              <a:buChar char="•"/>
+              <a:defRPr sz="2000" kern="1200">
+                <a:solidFill>
+                  <a:schemeClr val="tx1"/>
+                </a:solidFill>
+                <a:latin typeface="+mn-lt"/>
+                <a:ea typeface="+mn-ea"/>
+                <a:cs typeface="+mn-cs"/>
+              </a:defRPr>
+            </a:lvl3pPr>
+            <a:lvl4pPr marL="1600200" indent="-228600" algn="l" defTabSz="914400" rtl="0" eaLnBrk="1" latinLnBrk="0" hangingPunct="1">
+              <a:lnSpc>
+                <a:spcPct val="90000"/>
+              </a:lnSpc>
+              <a:spcBef>
+                <a:spcPts val="500"/>
+              </a:spcBef>
+              <a:buFont typeface="Arial" panose="020B0604020202020204" pitchFamily="34" charset="0"/>
+              <a:buChar char="•"/>
+              <a:defRPr sz="1800" kern="1200">
+                <a:solidFill>
+                  <a:schemeClr val="tx1"/>
+                </a:solidFill>
+                <a:latin typeface="+mn-lt"/>
+                <a:ea typeface="+mn-ea"/>
+                <a:cs typeface="+mn-cs"/>
+              </a:defRPr>
+            </a:lvl4pPr>
+            <a:lvl5pPr marL="2057400" indent="-228600" algn="l" defTabSz="914400" rtl="0" eaLnBrk="1" latinLnBrk="0" hangingPunct="1">
+              <a:lnSpc>
+                <a:spcPct val="90000"/>
+              </a:lnSpc>
+              <a:spcBef>
+                <a:spcPts val="500"/>
+              </a:spcBef>
+              <a:buFont typeface="Arial" panose="020B0604020202020204" pitchFamily="34" charset="0"/>
+              <a:buChar char="•"/>
+              <a:defRPr sz="1800" kern="1200">
+                <a:solidFill>
+                  <a:schemeClr val="tx1"/>
+                </a:solidFill>
+                <a:latin typeface="+mn-lt"/>
+                <a:ea typeface="+mn-ea"/>
+                <a:cs typeface="+mn-cs"/>
+              </a:defRPr>
+            </a:lvl5pPr>
+            <a:lvl6pPr marL="2514600" indent="-228600" algn="l" defTabSz="914400" rtl="0" eaLnBrk="1" latinLnBrk="0" hangingPunct="1">
+              <a:lnSpc>
+                <a:spcPct val="90000"/>
+              </a:lnSpc>
+              <a:spcBef>
+                <a:spcPts val="500"/>
+              </a:spcBef>
+              <a:buFont typeface="Arial" panose="020B0604020202020204" pitchFamily="34" charset="0"/>
+              <a:buChar char="•"/>
+              <a:defRPr sz="1800" kern="1200">
+                <a:solidFill>
+                  <a:schemeClr val="tx1"/>
+                </a:solidFill>
+                <a:latin typeface="+mn-lt"/>
+                <a:ea typeface="+mn-ea"/>
+                <a:cs typeface="+mn-cs"/>
+              </a:defRPr>
+            </a:lvl6pPr>
+            <a:lvl7pPr marL="2971800" indent="-228600" algn="l" defTabSz="914400" rtl="0" eaLnBrk="1" latinLnBrk="0" hangingPunct="1">
+              <a:lnSpc>
+                <a:spcPct val="90000"/>
+              </a:lnSpc>
+              <a:spcBef>
+                <a:spcPts val="500"/>
+              </a:spcBef>
+              <a:buFont typeface="Arial" panose="020B0604020202020204" pitchFamily="34" charset="0"/>
+              <a:buChar char="•"/>
+              <a:defRPr sz="1800" kern="1200">
+                <a:solidFill>
+                  <a:schemeClr val="tx1"/>
+                </a:solidFill>
+                <a:latin typeface="+mn-lt"/>
+                <a:ea typeface="+mn-ea"/>
+                <a:cs typeface="+mn-cs"/>
+              </a:defRPr>
+            </a:lvl7pPr>
+            <a:lvl8pPr marL="3429000" indent="-228600" algn="l" defTabSz="914400" rtl="0" eaLnBrk="1" latinLnBrk="0" hangingPunct="1">
+              <a:lnSpc>
+                <a:spcPct val="90000"/>
+              </a:lnSpc>
+              <a:spcBef>
+                <a:spcPts val="500"/>
+              </a:spcBef>
+              <a:buFont typeface="Arial" panose="020B0604020202020204" pitchFamily="34" charset="0"/>
+              <a:buChar char="•"/>
+              <a:defRPr sz="1800" kern="1200">
+                <a:solidFill>
+                  <a:schemeClr val="tx1"/>
+                </a:solidFill>
+                <a:latin typeface="+mn-lt"/>
+                <a:ea typeface="+mn-ea"/>
+                <a:cs typeface="+mn-cs"/>
+              </a:defRPr>
+            </a:lvl8pPr>
+            <a:lvl9pPr marL="3886200" indent="-228600" algn="l" defTabSz="914400" rtl="0" eaLnBrk="1" latinLnBrk="0" hangingPunct="1">
+              <a:lnSpc>
+                <a:spcPct val="90000"/>
+              </a:lnSpc>
+              <a:spcBef>
+                <a:spcPts val="500"/>
+              </a:spcBef>
+              <a:buFont typeface="Arial" panose="020B0604020202020204" pitchFamily="34" charset="0"/>
+              <a:buChar char="•"/>
+              <a:defRPr sz="1800" kern="1200">
+                <a:solidFill>
+                  <a:schemeClr val="tx1"/>
+                </a:solidFill>
+                <a:latin typeface="+mn-lt"/>
+                <a:ea typeface="+mn-ea"/>
+                <a:cs typeface="+mn-cs"/>
+              </a:defRPr>
+            </a:lvl9pPr>
+          </a:lstStyle>
+          <a:p>
+            <a:pPr marL="0" indent="0">
+              <a:buFont typeface="Arial" panose="020B0604020202020204" pitchFamily="34" charset="0"/>
+              <a:buNone/>
+            </a:pPr>
+            <a:r>
+              <a:rPr lang="en-GB" sz="2000" dirty="0"/>
+              <a:t>maze_modes.py</a:t>
+            </a:r>
+            <a:endParaRPr lang="en-AU" sz="2000" dirty="0"/>
+          </a:p>
+        </p:txBody>
+      </p:sp>
+      <p:pic>
+        <p:nvPicPr>
+          <p:cNvPr id="5" name="Picture 4">
+            <a:extLst>
+              <a:ext uri="{FF2B5EF4-FFF2-40B4-BE49-F238E27FC236}">
+                <a16:creationId xmlns:a16="http://schemas.microsoft.com/office/drawing/2014/main" id="{3F5DB75E-27F3-A928-1DFB-1D0707BA0BAA}"/>
+              </a:ext>
+            </a:extLst>
+          </p:cNvPr>
+          <p:cNvPicPr>
+            <a:picLocks noChangeAspect="1"/>
+          </p:cNvPicPr>
+          <p:nvPr/>
+        </p:nvPicPr>
+        <p:blipFill>
+          <a:blip r:embed="rId2"/>
+          <a:stretch>
+            <a:fillRect/>
+          </a:stretch>
+        </p:blipFill>
+        <p:spPr>
+          <a:xfrm>
+            <a:off x="315354" y="906561"/>
+            <a:ext cx="6902534" cy="5769542"/>
+          </a:xfrm>
+          <a:prstGeom prst="rect">
+            <a:avLst/>
+          </a:prstGeom>
+        </p:spPr>
+      </p:pic>
+      <p:pic>
+        <p:nvPicPr>
+          <p:cNvPr id="9" name="Picture 8">
+            <a:extLst>
+              <a:ext uri="{FF2B5EF4-FFF2-40B4-BE49-F238E27FC236}">
+                <a16:creationId xmlns:a16="http://schemas.microsoft.com/office/drawing/2014/main" id="{984839CA-EBF9-7BC2-A428-EC0AE79D1A06}"/>
+              </a:ext>
+            </a:extLst>
+          </p:cNvPr>
+          <p:cNvPicPr>
+            <a:picLocks noChangeAspect="1"/>
+          </p:cNvPicPr>
+          <p:nvPr/>
+        </p:nvPicPr>
+        <p:blipFill>
+          <a:blip r:embed="rId3"/>
+          <a:stretch>
+            <a:fillRect/>
+          </a:stretch>
+        </p:blipFill>
+        <p:spPr>
+          <a:xfrm>
+            <a:off x="7452126" y="2381399"/>
+            <a:ext cx="4346584" cy="1740796"/>
+          </a:xfrm>
+          <a:prstGeom prst="rect">
+            <a:avLst/>
+          </a:prstGeom>
+        </p:spPr>
+      </p:pic>
+    </p:spTree>
+    <p:extLst>
+      <p:ext uri="{BB962C8B-B14F-4D97-AF65-F5344CB8AC3E}">
+        <p14:creationId xmlns:p14="http://schemas.microsoft.com/office/powerpoint/2010/main" val="4020115960"/>
+      </p:ext>
+    </p:extLst>
+  </p:cSld>
+  <p:clrMapOvr>
+    <a:masterClrMapping/>
+  </p:clrMapOvr>
+</p:sld>
+</file>
+
+<file path=ppt/slides/slide8.xml><?xml version="1.0" encoding="utf-8"?>
+<p:sld xmlns:a="http://schemas.openxmlformats.org/drawingml/2006/main" xmlns:r="http://schemas.openxmlformats.org/officeDocument/2006/relationships" xmlns:p="http://schemas.openxmlformats.org/presentationml/2006/main">
+  <p:cSld>
+    <p:spTree>
+      <p:nvGrpSpPr>
+        <p:cNvPr id="1" name=""/>
+        <p:cNvGrpSpPr/>
+        <p:nvPr/>
+      </p:nvGrpSpPr>
+      <p:grpSpPr>
+        <a:xfrm>
+          <a:off x="0" y="0"/>
+          <a:ext cx="0" cy="0"/>
+          <a:chOff x="0" y="0"/>
+          <a:chExt cx="0" cy="0"/>
+        </a:xfrm>
+      </p:grpSpPr>
+      <p:sp>
+        <p:nvSpPr>
+          <p:cNvPr id="2" name="Title 1">
+            <a:extLst>
+              <a:ext uri="{FF2B5EF4-FFF2-40B4-BE49-F238E27FC236}">
+                <a16:creationId xmlns:a16="http://schemas.microsoft.com/office/drawing/2014/main" id="{8868A658-9290-2CF0-C79C-1C3075D648DD}"/>
+              </a:ext>
+            </a:extLst>
+          </p:cNvPr>
+          <p:cNvSpPr>
+            <a:spLocks noGrp="1"/>
+          </p:cNvSpPr>
+          <p:nvPr>
+            <p:ph type="title"/>
+          </p:nvPr>
+        </p:nvSpPr>
+        <p:spPr>
+          <a:xfrm>
+            <a:off x="81116" y="-244475"/>
+            <a:ext cx="10515600" cy="1325563"/>
+          </a:xfrm>
+        </p:spPr>
+        <p:txBody>
+          <a:bodyPr>
+            <a:normAutofit/>
+          </a:bodyPr>
+          <a:lstStyle/>
+          <a:p>
+            <a:r>
+              <a:rPr lang="en-GB" sz="3600" dirty="0"/>
+              <a:t>Features: Output Maze to .txt file</a:t>
+            </a:r>
+            <a:endParaRPr lang="en-AU" sz="3600" dirty="0"/>
+          </a:p>
+        </p:txBody>
+      </p:sp>
+      <p:sp>
+        <p:nvSpPr>
+          <p:cNvPr id="4" name="Content Placeholder 2">
+            <a:extLst>
+              <a:ext uri="{FF2B5EF4-FFF2-40B4-BE49-F238E27FC236}">
+                <a16:creationId xmlns:a16="http://schemas.microsoft.com/office/drawing/2014/main" id="{54DC3A41-1129-99F1-AF44-7A10F0118AB7}"/>
+              </a:ext>
+            </a:extLst>
+          </p:cNvPr>
+          <p:cNvSpPr txBox="1">
+            <a:spLocks/>
+          </p:cNvSpPr>
+          <p:nvPr/>
+        </p:nvSpPr>
+        <p:spPr>
+          <a:xfrm>
+            <a:off x="81116" y="532122"/>
+            <a:ext cx="3950110" cy="583279"/>
+          </a:xfrm>
+          <a:prstGeom prst="rect">
+            <a:avLst/>
+          </a:prstGeom>
+        </p:spPr>
+        <p:txBody>
+          <a:bodyPr vert="horz" lIns="91440" tIns="45720" rIns="91440" bIns="45720" rtlCol="0">
+            <a:normAutofit/>
+          </a:bodyPr>
+          <a:lstStyle>
+            <a:lvl1pPr marL="228600" indent="-228600" algn="l" defTabSz="914400" rtl="0" eaLnBrk="1" latinLnBrk="0" hangingPunct="1">
+              <a:lnSpc>
+                <a:spcPct val="90000"/>
+              </a:lnSpc>
+              <a:spcBef>
+                <a:spcPts val="1000"/>
+              </a:spcBef>
+              <a:buFont typeface="Arial" panose="020B0604020202020204" pitchFamily="34" charset="0"/>
+              <a:buChar char="•"/>
+              <a:defRPr sz="2800" kern="1200">
+                <a:solidFill>
+                  <a:schemeClr val="tx1"/>
+                </a:solidFill>
+                <a:latin typeface="+mn-lt"/>
+                <a:ea typeface="+mn-ea"/>
+                <a:cs typeface="+mn-cs"/>
+              </a:defRPr>
+            </a:lvl1pPr>
+            <a:lvl2pPr marL="685800" indent="-228600" algn="l" defTabSz="914400" rtl="0" eaLnBrk="1" latinLnBrk="0" hangingPunct="1">
+              <a:lnSpc>
+                <a:spcPct val="90000"/>
+              </a:lnSpc>
+              <a:spcBef>
+                <a:spcPts val="500"/>
+              </a:spcBef>
+              <a:buFont typeface="Arial" panose="020B0604020202020204" pitchFamily="34" charset="0"/>
+              <a:buChar char="•"/>
+              <a:defRPr sz="2400" kern="1200">
+                <a:solidFill>
+                  <a:schemeClr val="tx1"/>
+                </a:solidFill>
+                <a:latin typeface="+mn-lt"/>
+                <a:ea typeface="+mn-ea"/>
+                <a:cs typeface="+mn-cs"/>
+              </a:defRPr>
+            </a:lvl2pPr>
+            <a:lvl3pPr marL="1143000" indent="-228600" algn="l" defTabSz="914400" rtl="0" eaLnBrk="1" latinLnBrk="0" hangingPunct="1">
+              <a:lnSpc>
+                <a:spcPct val="90000"/>
+              </a:lnSpc>
+              <a:spcBef>
+                <a:spcPts val="500"/>
+              </a:spcBef>
+              <a:buFont typeface="Arial" panose="020B0604020202020204" pitchFamily="34" charset="0"/>
+              <a:buChar char="•"/>
+              <a:defRPr sz="2000" kern="1200">
+                <a:solidFill>
+                  <a:schemeClr val="tx1"/>
+                </a:solidFill>
+                <a:latin typeface="+mn-lt"/>
+                <a:ea typeface="+mn-ea"/>
+                <a:cs typeface="+mn-cs"/>
+              </a:defRPr>
+            </a:lvl3pPr>
+            <a:lvl4pPr marL="1600200" indent="-228600" algn="l" defTabSz="914400" rtl="0" eaLnBrk="1" latinLnBrk="0" hangingPunct="1">
+              <a:lnSpc>
+                <a:spcPct val="90000"/>
+              </a:lnSpc>
+              <a:spcBef>
+                <a:spcPts val="500"/>
+              </a:spcBef>
+              <a:buFont typeface="Arial" panose="020B0604020202020204" pitchFamily="34" charset="0"/>
+              <a:buChar char="•"/>
+              <a:defRPr sz="1800" kern="1200">
+                <a:solidFill>
+                  <a:schemeClr val="tx1"/>
+                </a:solidFill>
+                <a:latin typeface="+mn-lt"/>
+                <a:ea typeface="+mn-ea"/>
+                <a:cs typeface="+mn-cs"/>
+              </a:defRPr>
+            </a:lvl4pPr>
+            <a:lvl5pPr marL="2057400" indent="-228600" algn="l" defTabSz="914400" rtl="0" eaLnBrk="1" latinLnBrk="0" hangingPunct="1">
+              <a:lnSpc>
+                <a:spcPct val="90000"/>
+              </a:lnSpc>
+              <a:spcBef>
+                <a:spcPts val="500"/>
+              </a:spcBef>
+              <a:buFont typeface="Arial" panose="020B0604020202020204" pitchFamily="34" charset="0"/>
+              <a:buChar char="•"/>
+              <a:defRPr sz="1800" kern="1200">
+                <a:solidFill>
+                  <a:schemeClr val="tx1"/>
+                </a:solidFill>
+                <a:latin typeface="+mn-lt"/>
+                <a:ea typeface="+mn-ea"/>
+                <a:cs typeface="+mn-cs"/>
+              </a:defRPr>
+            </a:lvl5pPr>
+            <a:lvl6pPr marL="2514600" indent="-228600" algn="l" defTabSz="914400" rtl="0" eaLnBrk="1" latinLnBrk="0" hangingPunct="1">
+              <a:lnSpc>
+                <a:spcPct val="90000"/>
+              </a:lnSpc>
+              <a:spcBef>
+                <a:spcPts val="500"/>
+              </a:spcBef>
+              <a:buFont typeface="Arial" panose="020B0604020202020204" pitchFamily="34" charset="0"/>
+              <a:buChar char="•"/>
+              <a:defRPr sz="1800" kern="1200">
+                <a:solidFill>
+                  <a:schemeClr val="tx1"/>
+                </a:solidFill>
+                <a:latin typeface="+mn-lt"/>
+                <a:ea typeface="+mn-ea"/>
+                <a:cs typeface="+mn-cs"/>
+              </a:defRPr>
+            </a:lvl6pPr>
+            <a:lvl7pPr marL="2971800" indent="-228600" algn="l" defTabSz="914400" rtl="0" eaLnBrk="1" latinLnBrk="0" hangingPunct="1">
+              <a:lnSpc>
+                <a:spcPct val="90000"/>
+              </a:lnSpc>
+              <a:spcBef>
+                <a:spcPts val="500"/>
+              </a:spcBef>
+              <a:buFont typeface="Arial" panose="020B0604020202020204" pitchFamily="34" charset="0"/>
+              <a:buChar char="•"/>
+              <a:defRPr sz="1800" kern="1200">
+                <a:solidFill>
+                  <a:schemeClr val="tx1"/>
+                </a:solidFill>
+                <a:latin typeface="+mn-lt"/>
+                <a:ea typeface="+mn-ea"/>
+                <a:cs typeface="+mn-cs"/>
+              </a:defRPr>
+            </a:lvl7pPr>
+            <a:lvl8pPr marL="3429000" indent="-228600" algn="l" defTabSz="914400" rtl="0" eaLnBrk="1" latinLnBrk="0" hangingPunct="1">
+              <a:lnSpc>
+                <a:spcPct val="90000"/>
+              </a:lnSpc>
+              <a:spcBef>
+                <a:spcPts val="500"/>
+              </a:spcBef>
+              <a:buFont typeface="Arial" panose="020B0604020202020204" pitchFamily="34" charset="0"/>
+              <a:buChar char="•"/>
+              <a:defRPr sz="1800" kern="1200">
+                <a:solidFill>
+                  <a:schemeClr val="tx1"/>
+                </a:solidFill>
+                <a:latin typeface="+mn-lt"/>
+                <a:ea typeface="+mn-ea"/>
+                <a:cs typeface="+mn-cs"/>
+              </a:defRPr>
+            </a:lvl8pPr>
+            <a:lvl9pPr marL="3886200" indent="-228600" algn="l" defTabSz="914400" rtl="0" eaLnBrk="1" latinLnBrk="0" hangingPunct="1">
+              <a:lnSpc>
+                <a:spcPct val="90000"/>
+              </a:lnSpc>
+              <a:spcBef>
+                <a:spcPts val="500"/>
+              </a:spcBef>
+              <a:buFont typeface="Arial" panose="020B0604020202020204" pitchFamily="34" charset="0"/>
+              <a:buChar char="•"/>
+              <a:defRPr sz="1800" kern="1200">
+                <a:solidFill>
+                  <a:schemeClr val="tx1"/>
+                </a:solidFill>
+                <a:latin typeface="+mn-lt"/>
+                <a:ea typeface="+mn-ea"/>
+                <a:cs typeface="+mn-cs"/>
+              </a:defRPr>
+            </a:lvl9pPr>
+          </a:lstStyle>
+          <a:p>
+            <a:pPr marL="0" indent="0">
+              <a:buFont typeface="Arial" panose="020B0604020202020204" pitchFamily="34" charset="0"/>
+              <a:buNone/>
+            </a:pPr>
+            <a:r>
+              <a:rPr lang="en-GB" sz="2000" dirty="0"/>
+              <a:t>maze_modes.py</a:t>
+            </a:r>
+            <a:endParaRPr lang="en-AU" sz="2000" dirty="0"/>
+          </a:p>
+        </p:txBody>
+      </p:sp>
+      <p:pic>
+        <p:nvPicPr>
+          <p:cNvPr id="6" name="Picture 5">
+            <a:extLst>
+              <a:ext uri="{FF2B5EF4-FFF2-40B4-BE49-F238E27FC236}">
+                <a16:creationId xmlns:a16="http://schemas.microsoft.com/office/drawing/2014/main" id="{6B7886E6-D8F2-9132-72CE-95E12CC135D9}"/>
+              </a:ext>
+            </a:extLst>
+          </p:cNvPr>
+          <p:cNvPicPr>
+            <a:picLocks noChangeAspect="1"/>
+          </p:cNvPicPr>
+          <p:nvPr/>
+        </p:nvPicPr>
+        <p:blipFill>
+          <a:blip r:embed="rId2"/>
+          <a:stretch>
+            <a:fillRect/>
+          </a:stretch>
+        </p:blipFill>
+        <p:spPr>
+          <a:xfrm>
+            <a:off x="163741" y="823761"/>
+            <a:ext cx="7734970" cy="5911336"/>
+          </a:xfrm>
+          <a:prstGeom prst="rect">
+            <a:avLst/>
+          </a:prstGeom>
+        </p:spPr>
+      </p:pic>
+      <p:pic>
+        <p:nvPicPr>
+          <p:cNvPr id="8" name="Picture 7">
+            <a:extLst>
+              <a:ext uri="{FF2B5EF4-FFF2-40B4-BE49-F238E27FC236}">
+                <a16:creationId xmlns:a16="http://schemas.microsoft.com/office/drawing/2014/main" id="{6AA34651-D595-12E9-BEDE-AFB0E428253E}"/>
+              </a:ext>
+            </a:extLst>
+          </p:cNvPr>
+          <p:cNvPicPr>
+            <a:picLocks noChangeAspect="1"/>
+          </p:cNvPicPr>
+          <p:nvPr/>
+        </p:nvPicPr>
+        <p:blipFill>
+          <a:blip r:embed="rId3"/>
+          <a:stretch>
+            <a:fillRect/>
+          </a:stretch>
+        </p:blipFill>
+        <p:spPr>
+          <a:xfrm>
+            <a:off x="8436078" y="1274777"/>
+            <a:ext cx="3332042" cy="4851778"/>
+          </a:xfrm>
+          <a:prstGeom prst="rect">
+            <a:avLst/>
+          </a:prstGeom>
+        </p:spPr>
+      </p:pic>
+    </p:spTree>
+    <p:extLst>
+      <p:ext uri="{BB962C8B-B14F-4D97-AF65-F5344CB8AC3E}">
+        <p14:creationId xmlns:p14="http://schemas.microsoft.com/office/powerpoint/2010/main" val="3568579617"/>
+      </p:ext>
+    </p:extLst>
+  </p:cSld>
+  <p:clrMapOvr>
+    <a:masterClrMapping/>
+  </p:clrMapOvr>
+</p:sld>
+</file>
+
+<file path=ppt/slides/slide9.xml><?xml version="1.0" encoding="utf-8"?>
+<p:sld xmlns:a="http://schemas.openxmlformats.org/drawingml/2006/main" xmlns:r="http://schemas.openxmlformats.org/officeDocument/2006/relationships" xmlns:p="http://schemas.openxmlformats.org/presentationml/2006/main">
+  <p:cSld>
+    <p:spTree>
+      <p:nvGrpSpPr>
+        <p:cNvPr id="1" name=""/>
+        <p:cNvGrpSpPr/>
+        <p:nvPr/>
+      </p:nvGrpSpPr>
+      <p:grpSpPr>
+        <a:xfrm>
+          <a:off x="0" y="0"/>
+          <a:ext cx="0" cy="0"/>
+          <a:chOff x="0" y="0"/>
+          <a:chExt cx="0" cy="0"/>
+        </a:xfrm>
+      </p:grpSpPr>
+      <p:sp>
+        <p:nvSpPr>
+          <p:cNvPr id="2" name="Title 1">
+            <a:extLst>
+              <a:ext uri="{FF2B5EF4-FFF2-40B4-BE49-F238E27FC236}">
+                <a16:creationId xmlns:a16="http://schemas.microsoft.com/office/drawing/2014/main" id="{8868A658-9290-2CF0-C79C-1C3075D648DD}"/>
+              </a:ext>
+            </a:extLst>
+          </p:cNvPr>
+          <p:cNvSpPr>
+            <a:spLocks noGrp="1"/>
+          </p:cNvSpPr>
+          <p:nvPr>
+            <p:ph type="title"/>
+          </p:nvPr>
+        </p:nvSpPr>
+        <p:spPr>
+          <a:xfrm>
+            <a:off x="543233" y="2624547"/>
+            <a:ext cx="10515600" cy="1325563"/>
+          </a:xfrm>
+        </p:spPr>
+        <p:txBody>
+          <a:bodyPr>
+            <a:normAutofit/>
+          </a:bodyPr>
+          <a:lstStyle/>
+          <a:p>
+            <a:r>
+              <a:rPr lang="en-GB" dirty="0"/>
+              <a:t>Live demo: How to use application</a:t>
+            </a:r>
+            <a:endParaRPr lang="en-AU" dirty="0"/>
+          </a:p>
+        </p:txBody>
+      </p:sp>
+    </p:spTree>
+    <p:extLst>
+      <p:ext uri="{BB962C8B-B14F-4D97-AF65-F5344CB8AC3E}">
+        <p14:creationId xmlns:p14="http://schemas.microsoft.com/office/powerpoint/2010/main" val="3610690233"/>
       </p:ext>
     </p:extLst>
   </p:cSld>

</xml_diff>

<commit_message>
export slides to pdf, added youtube link to readme.md
</commit_message>
<xml_diff>
--- a/ppt/slide presentation.pptx
+++ b/ppt/slide presentation.pptx
@@ -4123,7 +4123,7 @@
         </p:blipFill>
         <p:spPr>
           <a:xfrm>
-            <a:off x="503903" y="1328482"/>
+            <a:off x="503902" y="1190164"/>
             <a:ext cx="5867400" cy="446241"/>
           </a:xfrm>
           <a:prstGeom prst="rect">
@@ -4153,8 +4153,8 @@
         </p:blipFill>
         <p:spPr>
           <a:xfrm>
-            <a:off x="503903" y="2022117"/>
-            <a:ext cx="6378678" cy="3926400"/>
+            <a:off x="503902" y="2759536"/>
+            <a:ext cx="6663813" cy="3926400"/>
           </a:xfrm>
           <a:prstGeom prst="rect">
             <a:avLst/>
@@ -4389,6 +4389,36 @@
           <a:xfrm>
             <a:off x="7519220" y="2066362"/>
             <a:ext cx="3709108" cy="2416902"/>
+          </a:xfrm>
+          <a:prstGeom prst="rect">
+            <a:avLst/>
+          </a:prstGeom>
+        </p:spPr>
+      </p:pic>
+      <p:pic>
+        <p:nvPicPr>
+          <p:cNvPr id="17" name="Picture 16">
+            <a:extLst>
+              <a:ext uri="{FF2B5EF4-FFF2-40B4-BE49-F238E27FC236}">
+                <a16:creationId xmlns:a16="http://schemas.microsoft.com/office/drawing/2014/main" id="{6945D4DE-9CBB-C58B-D84D-BEB602AAA5F8}"/>
+              </a:ext>
+            </a:extLst>
+          </p:cNvPr>
+          <p:cNvPicPr>
+            <a:picLocks noChangeAspect="1"/>
+          </p:cNvPicPr>
+          <p:nvPr/>
+        </p:nvPicPr>
+        <p:blipFill>
+          <a:blip r:embed="rId5"/>
+          <a:stretch>
+            <a:fillRect/>
+          </a:stretch>
+        </p:blipFill>
+        <p:spPr>
+          <a:xfrm>
+            <a:off x="503902" y="1745481"/>
+            <a:ext cx="3458497" cy="893807"/>
           </a:xfrm>
           <a:prstGeom prst="rect">
             <a:avLst/>

</xml_diff>